<commit_message>
Add one more image to lecture_6.pptx
</commit_message>
<xml_diff>
--- a/06_Firebase/lecture_6.pptx
+++ b/06_Firebase/lecture_6.pptx
@@ -22463,6 +22463,46 @@
           </a:effectLst>
         </p:spPr>
       </p:pic>
+      <p:pic>
+        <p:nvPicPr>
+          <p:cNvPr id="11" name="Picture 10">
+            <a:extLst>
+              <a:ext uri="{FF2B5EF4-FFF2-40B4-BE49-F238E27FC236}">
+                <a16:creationId xmlns:a16="http://schemas.microsoft.com/office/drawing/2014/main" id="{B7D73700-661D-4826-B5E8-D510F9BBE71E}"/>
+              </a:ext>
+            </a:extLst>
+          </p:cNvPr>
+          <p:cNvPicPr>
+            <a:picLocks noChangeAspect="1"/>
+          </p:cNvPicPr>
+          <p:nvPr/>
+        </p:nvPicPr>
+        <p:blipFill>
+          <a:blip r:embed="rId9"/>
+          <a:stretch>
+            <a:fillRect/>
+          </a:stretch>
+        </p:blipFill>
+        <p:spPr>
+          <a:xfrm>
+            <a:off x="7654844" y="1788367"/>
+            <a:ext cx="2349311" cy="3698031"/>
+          </a:xfrm>
+          <a:prstGeom prst="rect">
+            <a:avLst/>
+          </a:prstGeom>
+          <a:ln>
+            <a:noFill/>
+          </a:ln>
+          <a:effectLst>
+            <a:outerShdw blurRad="190500" algn="tl" rotWithShape="0">
+              <a:srgbClr val="000000">
+                <a:alpha val="70000"/>
+              </a:srgbClr>
+            </a:outerShdw>
+          </a:effectLst>
+        </p:spPr>
+      </p:pic>
     </p:spTree>
     <p:extLst>
       <p:ext uri="{BB962C8B-B14F-4D97-AF65-F5344CB8AC3E}">
@@ -25112,6 +25152,15 @@
 </file>
 
 <file path=customXml/item1.xml><?xml version="1.0" encoding="utf-8"?>
+<?mso-contentType ?>
+<FormTemplates xmlns="http://schemas.microsoft.com/sharepoint/v3/contenttype/forms">
+  <Display>DocumentLibraryForm</Display>
+  <Edit>DocumentLibraryForm</Edit>
+  <New>DocumentLibraryForm</New>
+</FormTemplates>
+</file>
+
+<file path=customXml/item2.xml><?xml version="1.0" encoding="utf-8"?>
 <ct:contentTypeSchema xmlns:ct="http://schemas.microsoft.com/office/2006/metadata/contentType" xmlns:ma="http://schemas.microsoft.com/office/2006/metadata/properties/metaAttributes" ct:_="" ma:_="" ma:contentTypeName="Document" ma:contentTypeID="0x01010021F0ECD861B6C24D9DE6C610410A9680" ma:contentTypeVersion="11" ma:contentTypeDescription="Create a new document." ma:contentTypeScope="" ma:versionID="c1e6361be1704c346fd95d433b8f96cc">
   <xsd:schema xmlns:xsd="http://www.w3.org/2001/XMLSchema" xmlns:xs="http://www.w3.org/2001/XMLSchema" xmlns:p="http://schemas.microsoft.com/office/2006/metadata/properties" xmlns:ns1="http://schemas.microsoft.com/sharepoint/v3" xmlns:ns2="8f2d48a8-3d15-4a9a-bc6b-e84b4fa59525" xmlns:ns3="843bd4ae-105e-484a-97ba-9cfb3101a146" targetNamespace="http://schemas.microsoft.com/office/2006/metadata/properties" ma:root="true" ma:fieldsID="b37878c8533b0244faa46792825990a5" ns1:_="" ns2:_="" ns3:_="">
     <xsd:import namespace="http://schemas.microsoft.com/sharepoint/v3"/>
@@ -25356,37 +25405,7 @@
 </ct:contentTypeSchema>
 </file>
 
-<file path=customXml/item2.xml><?xml version="1.0" encoding="utf-8"?>
-<?mso-contentType ?>
-<FormTemplates xmlns="http://schemas.microsoft.com/sharepoint/v3/contenttype/forms">
-  <Display>DocumentLibraryForm</Display>
-  <Edit>DocumentLibraryForm</Edit>
-  <New>DocumentLibraryForm</New>
-</FormTemplates>
-</file>
-
 <file path=customXml/item3.xml><?xml version="1.0" encoding="utf-8"?>
-<p:properties xmlns:p="http://schemas.microsoft.com/office/2006/metadata/properties" xmlns:xsi="http://www.w3.org/2001/XMLSchema-instance" xmlns:pc="http://schemas.microsoft.com/office/infopath/2007/PartnerControls">
-  <documentManagement>
-    <SharedWithUsers xmlns="843bd4ae-105e-484a-97ba-9cfb3101a146">
-      <UserInfo>
-        <DisplayName>COO Members</DisplayName>
-        <AccountId>173</AccountId>
-        <AccountType/>
-      </UserInfo>
-    </SharedWithUsers>
-    <PublishingExpirationDate xmlns="http://schemas.microsoft.com/sharepoint/v3" xsi:nil="true"/>
-    <PublishingStartDate xmlns="http://schemas.microsoft.com/sharepoint/v3" xsi:nil="true"/>
-    <_dlc_DocId xmlns="843bd4ae-105e-484a-97ba-9cfb3101a146">ASDOC-2102554853-32878</_dlc_DocId>
-    <_dlc_DocIdUrl xmlns="843bd4ae-105e-484a-97ba-9cfb3101a146">
-      <Url>https://autsoft.sharepoint.com/_layouts/15/DocIdRedir.aspx?ID=ASDOC-2102554853-32878</Url>
-      <Description>ASDOC-2102554853-32878</Description>
-    </_dlc_DocIdUrl>
-  </documentManagement>
-</p:properties>
-</file>
-
-<file path=customXml/item4.xml><?xml version="1.0" encoding="utf-8"?>
 <?mso-contentType ?>
 <spe:Receivers xmlns:spe="http://schemas.microsoft.com/sharepoint/events">
   <Receiver>
@@ -25436,7 +25455,36 @@
 </spe:Receivers>
 </file>
 
+<file path=customXml/item4.xml><?xml version="1.0" encoding="utf-8"?>
+<p:properties xmlns:p="http://schemas.microsoft.com/office/2006/metadata/properties" xmlns:xsi="http://www.w3.org/2001/XMLSchema-instance" xmlns:pc="http://schemas.microsoft.com/office/infopath/2007/PartnerControls">
+  <documentManagement>
+    <SharedWithUsers xmlns="843bd4ae-105e-484a-97ba-9cfb3101a146">
+      <UserInfo>
+        <DisplayName>COO Members</DisplayName>
+        <AccountId>173</AccountId>
+        <AccountType/>
+      </UserInfo>
+    </SharedWithUsers>
+    <PublishingExpirationDate xmlns="http://schemas.microsoft.com/sharepoint/v3" xsi:nil="true"/>
+    <PublishingStartDate xmlns="http://schemas.microsoft.com/sharepoint/v3" xsi:nil="true"/>
+    <_dlc_DocId xmlns="843bd4ae-105e-484a-97ba-9cfb3101a146">ASDOC-2102554853-32878</_dlc_DocId>
+    <_dlc_DocIdUrl xmlns="843bd4ae-105e-484a-97ba-9cfb3101a146">
+      <Url>https://autsoft.sharepoint.com/_layouts/15/DocIdRedir.aspx?ID=ASDOC-2102554853-32878</Url>
+      <Description>ASDOC-2102554853-32878</Description>
+    </_dlc_DocIdUrl>
+  </documentManagement>
+</p:properties>
+</file>
+
 <file path=customXml/itemProps1.xml><?xml version="1.0" encoding="utf-8"?>
+<ds:datastoreItem xmlns:ds="http://schemas.openxmlformats.org/officeDocument/2006/customXml" ds:itemID="{32659024-6793-4229-A8F7-FFA3A70DC1AD}">
+  <ds:schemaRefs>
+    <ds:schemaRef ds:uri="http://schemas.microsoft.com/sharepoint/v3/contenttype/forms"/>
+  </ds:schemaRefs>
+</ds:datastoreItem>
+</file>
+
+<file path=customXml/itemProps2.xml><?xml version="1.0" encoding="utf-8"?>
 <ds:datastoreItem xmlns:ds="http://schemas.openxmlformats.org/officeDocument/2006/customXml" ds:itemID="{5E17CC5E-31FE-4495-9412-9CA01119BB3F}">
   <ds:schemaRefs>
     <ds:schemaRef ds:uri="http://schemas.microsoft.com/office/2006/metadata/contentType"/>
@@ -25456,15 +25504,15 @@
 </ds:datastoreItem>
 </file>
 
-<file path=customXml/itemProps2.xml><?xml version="1.0" encoding="utf-8"?>
-<ds:datastoreItem xmlns:ds="http://schemas.openxmlformats.org/officeDocument/2006/customXml" ds:itemID="{32659024-6793-4229-A8F7-FFA3A70DC1AD}">
+<file path=customXml/itemProps3.xml><?xml version="1.0" encoding="utf-8"?>
+<ds:datastoreItem xmlns:ds="http://schemas.openxmlformats.org/officeDocument/2006/customXml" ds:itemID="{8D554448-F89C-4C8D-AEBC-43921BA3BA45}">
   <ds:schemaRefs>
-    <ds:schemaRef ds:uri="http://schemas.microsoft.com/sharepoint/v3/contenttype/forms"/>
+    <ds:schemaRef ds:uri="http://schemas.microsoft.com/sharepoint/events"/>
   </ds:schemaRefs>
 </ds:datastoreItem>
 </file>
 
-<file path=customXml/itemProps3.xml><?xml version="1.0" encoding="utf-8"?>
+<file path=customXml/itemProps4.xml><?xml version="1.0" encoding="utf-8"?>
 <ds:datastoreItem xmlns:ds="http://schemas.openxmlformats.org/officeDocument/2006/customXml" ds:itemID="{98FF91B1-8754-4CD5-9632-EF0FFADF1D25}">
   <ds:schemaRefs>
     <ds:schemaRef ds:uri="3b382b5e-089d-4a4c-b0b2-43ff698eeff2"/>
@@ -25481,12 +25529,4 @@
     <ds:schemaRef ds:uri="http://schemas.microsoft.com/sharepoint/v3"/>
   </ds:schemaRefs>
 </ds:datastoreItem>
-</file>
-
-<file path=customXml/itemProps4.xml><?xml version="1.0" encoding="utf-8"?>
-<ds:datastoreItem xmlns:ds="http://schemas.openxmlformats.org/officeDocument/2006/customXml" ds:itemID="{8D554448-F89C-4C8D-AEBC-43921BA3BA45}">
-  <ds:schemaRefs>
-    <ds:schemaRef ds:uri="http://schemas.microsoft.com/sharepoint/events"/>
-  </ds:schemaRefs>
-</ds:datastoreItem>
 </file>
</xml_diff>